<commit_message>
updated ppt and pics
</commit_message>
<xml_diff>
--- a/AWS_Case_Study_2.pptx
+++ b/AWS_Case_Study_2.pptx
@@ -7,7 +7,7 @@
     <p:sldMasterId id="2147483871" r:id="rId6"/>
   </p:sldMasterIdLst>
   <p:notesMasterIdLst>
-    <p:notesMasterId r:id="rId20"/>
+    <p:notesMasterId r:id="rId23"/>
   </p:notesMasterIdLst>
   <p:sldIdLst>
     <p:sldId id="256" r:id="rId7"/>
@@ -21,8 +21,11 @@
     <p:sldId id="715" r:id="rId15"/>
     <p:sldId id="714" r:id="rId16"/>
     <p:sldId id="712" r:id="rId17"/>
-    <p:sldId id="710" r:id="rId18"/>
-    <p:sldId id="694" r:id="rId19"/>
+    <p:sldId id="716" r:id="rId18"/>
+    <p:sldId id="717" r:id="rId19"/>
+    <p:sldId id="718" r:id="rId20"/>
+    <p:sldId id="710" r:id="rId21"/>
+    <p:sldId id="694" r:id="rId22"/>
   </p:sldIdLst>
   <p:sldSz cx="12192000" cy="6858000"/>
   <p:notesSz cx="6858000" cy="9144000"/>
@@ -8128,6 +8131,402 @@
           <p:cNvPr id="2" name="Title 1">
             <a:extLst>
               <a:ext uri="{FF2B5EF4-FFF2-40B4-BE49-F238E27FC236}">
+                <a16:creationId xmlns:a16="http://schemas.microsoft.com/office/drawing/2014/main" id="{BC0FD649-1353-4EB6-AE5E-7A70C52C5555}"/>
+              </a:ext>
+            </a:extLst>
+          </p:cNvPr>
+          <p:cNvSpPr>
+            <a:spLocks noGrp="1"/>
+          </p:cNvSpPr>
+          <p:nvPr>
+            <p:ph type="title"/>
+          </p:nvPr>
+        </p:nvSpPr>
+        <p:spPr>
+          <a:xfrm>
+            <a:off x="3001819" y="131141"/>
+            <a:ext cx="8134866" cy="656655"/>
+          </a:xfrm>
+        </p:spPr>
+        <p:txBody>
+          <a:bodyPr/>
+          <a:lstStyle/>
+          <a:p>
+            <a:r>
+              <a:rPr lang="en-US" dirty="0"/>
+              <a:t>Implementation flow</a:t>
+            </a:r>
+          </a:p>
+        </p:txBody>
+      </p:sp>
+      <p:sp>
+        <p:nvSpPr>
+          <p:cNvPr id="3" name="TextBox 2">
+            <a:extLst>
+              <a:ext uri="{FF2B5EF4-FFF2-40B4-BE49-F238E27FC236}">
+                <a16:creationId xmlns:a16="http://schemas.microsoft.com/office/drawing/2014/main" id="{69858218-4FB8-4F4E-B618-C9F85125418B}"/>
+              </a:ext>
+            </a:extLst>
+          </p:cNvPr>
+          <p:cNvSpPr txBox="1"/>
+          <p:nvPr/>
+        </p:nvSpPr>
+        <p:spPr>
+          <a:xfrm>
+            <a:off x="249382" y="1154544"/>
+            <a:ext cx="11822545" cy="4100481"/>
+          </a:xfrm>
+          <a:prstGeom prst="rect">
+            <a:avLst/>
+          </a:prstGeom>
+          <a:noFill/>
+        </p:spPr>
+        <p:txBody>
+          <a:bodyPr wrap="square" rtlCol="0">
+            <a:spAutoFit/>
+          </a:bodyPr>
+          <a:lstStyle/>
+          <a:p>
+            <a:pPr>
+              <a:lnSpc>
+                <a:spcPct val="300000"/>
+              </a:lnSpc>
+            </a:pPr>
+            <a:r>
+              <a:rPr lang="en-US" dirty="0">
+                <a:solidFill>
+                  <a:schemeClr val="bg1"/>
+                </a:solidFill>
+              </a:rPr>
+              <a:t>1. Move python script which is generating log files from S3 bucket to EC2 instance.</a:t>
+            </a:r>
+          </a:p>
+          <a:p>
+            <a:pPr>
+              <a:lnSpc>
+                <a:spcPct val="300000"/>
+              </a:lnSpc>
+            </a:pPr>
+            <a:r>
+              <a:rPr lang="en-US" dirty="0">
+                <a:solidFill>
+                  <a:schemeClr val="bg1"/>
+                </a:solidFill>
+              </a:rPr>
+              <a:t>2. Install kinesis agent and then configure </a:t>
+            </a:r>
+            <a:r>
+              <a:rPr lang="en-US" dirty="0" err="1">
+                <a:solidFill>
+                  <a:schemeClr val="bg1"/>
+                </a:solidFill>
+              </a:rPr>
+              <a:t>agent.json</a:t>
+            </a:r>
+            <a:r>
+              <a:rPr lang="en-US" dirty="0">
+                <a:solidFill>
+                  <a:schemeClr val="bg1"/>
+                </a:solidFill>
+              </a:rPr>
+              <a:t>.</a:t>
+            </a:r>
+          </a:p>
+          <a:p>
+            <a:pPr>
+              <a:lnSpc>
+                <a:spcPct val="300000"/>
+              </a:lnSpc>
+            </a:pPr>
+            <a:r>
+              <a:rPr lang="en-US" dirty="0">
+                <a:solidFill>
+                  <a:schemeClr val="bg1"/>
+                </a:solidFill>
+              </a:rPr>
+              <a:t>3. Attach necessary IAM roles with necessary permissions to EC2 (S3readOnly &amp; </a:t>
+            </a:r>
+            <a:r>
+              <a:rPr lang="en-US" dirty="0" err="1">
+                <a:solidFill>
+                  <a:schemeClr val="bg1"/>
+                </a:solidFill>
+              </a:rPr>
+              <a:t>FirehoseWriteOnly</a:t>
+            </a:r>
+            <a:r>
+              <a:rPr lang="en-US" dirty="0">
+                <a:solidFill>
+                  <a:schemeClr val="bg1"/>
+                </a:solidFill>
+              </a:rPr>
+              <a:t>), Kinesis Firehose.</a:t>
+            </a:r>
+          </a:p>
+          <a:p>
+            <a:pPr>
+              <a:lnSpc>
+                <a:spcPct val="300000"/>
+              </a:lnSpc>
+            </a:pPr>
+            <a:r>
+              <a:rPr lang="en-US" dirty="0">
+                <a:solidFill>
+                  <a:schemeClr val="bg1"/>
+                </a:solidFill>
+              </a:rPr>
+              <a:t>4. Execute python script on EC2 to generate log files continuously, simulating live data stream.</a:t>
+            </a:r>
+          </a:p>
+          <a:p>
+            <a:pPr>
+              <a:lnSpc>
+                <a:spcPct val="300000"/>
+              </a:lnSpc>
+            </a:pPr>
+            <a:r>
+              <a:rPr lang="en-US" dirty="0">
+                <a:solidFill>
+                  <a:schemeClr val="bg1"/>
+                </a:solidFill>
+              </a:rPr>
+              <a:t>5. Generated log files transferred to S3 bucket from EC2 via Firehose with the help of kinesis agent.</a:t>
+            </a:r>
+          </a:p>
+        </p:txBody>
+      </p:sp>
+    </p:spTree>
+    <p:extLst>
+      <p:ext uri="{BB962C8B-B14F-4D97-AF65-F5344CB8AC3E}">
+        <p14:creationId xmlns:p14="http://schemas.microsoft.com/office/powerpoint/2010/main" val="2018581167"/>
+      </p:ext>
+    </p:extLst>
+  </p:cSld>
+  <p:clrMapOvr>
+    <a:masterClrMapping/>
+  </p:clrMapOvr>
+</p:sld>
+</file>
+
+<file path=ppt/slides/slide13.xml><?xml version="1.0" encoding="utf-8"?>
+<p:sld xmlns:a="http://schemas.openxmlformats.org/drawingml/2006/main" xmlns:r="http://schemas.openxmlformats.org/officeDocument/2006/relationships" xmlns:p="http://schemas.openxmlformats.org/presentationml/2006/main">
+  <p:cSld>
+    <p:spTree>
+      <p:nvGrpSpPr>
+        <p:cNvPr id="1" name=""/>
+        <p:cNvGrpSpPr/>
+        <p:nvPr/>
+      </p:nvGrpSpPr>
+      <p:grpSpPr>
+        <a:xfrm>
+          <a:off x="0" y="0"/>
+          <a:ext cx="0" cy="0"/>
+          <a:chOff x="0" y="0"/>
+          <a:chExt cx="0" cy="0"/>
+        </a:xfrm>
+      </p:grpSpPr>
+      <p:sp>
+        <p:nvSpPr>
+          <p:cNvPr id="2" name="Title 1">
+            <a:extLst>
+              <a:ext uri="{FF2B5EF4-FFF2-40B4-BE49-F238E27FC236}">
+                <a16:creationId xmlns:a16="http://schemas.microsoft.com/office/drawing/2014/main" id="{E01EA717-48C5-4DB8-AC91-39B96565C197}"/>
+              </a:ext>
+            </a:extLst>
+          </p:cNvPr>
+          <p:cNvSpPr>
+            <a:spLocks noGrp="1"/>
+          </p:cNvSpPr>
+          <p:nvPr>
+            <p:ph type="title"/>
+          </p:nvPr>
+        </p:nvSpPr>
+        <p:spPr>
+          <a:xfrm>
+            <a:off x="4553527" y="140377"/>
+            <a:ext cx="7331302" cy="656655"/>
+          </a:xfrm>
+        </p:spPr>
+        <p:txBody>
+          <a:bodyPr/>
+          <a:lstStyle/>
+          <a:p>
+            <a:r>
+              <a:rPr lang="en-US" dirty="0" err="1"/>
+              <a:t>Agent.json</a:t>
+            </a:r>
+            <a:endParaRPr lang="en-US" dirty="0"/>
+          </a:p>
+        </p:txBody>
+      </p:sp>
+      <p:pic>
+        <p:nvPicPr>
+          <p:cNvPr id="4" name="Picture 3" descr="A screenshot of a computer&#10;&#10;Description automatically generated with medium confidence">
+            <a:extLst>
+              <a:ext uri="{FF2B5EF4-FFF2-40B4-BE49-F238E27FC236}">
+                <a16:creationId xmlns:a16="http://schemas.microsoft.com/office/drawing/2014/main" id="{C65C9C87-74E2-466C-AA66-9C833DEC64D4}"/>
+              </a:ext>
+            </a:extLst>
+          </p:cNvPr>
+          <p:cNvPicPr>
+            <a:picLocks noChangeAspect="1"/>
+          </p:cNvPicPr>
+          <p:nvPr/>
+        </p:nvPicPr>
+        <p:blipFill rotWithShape="1">
+          <a:blip r:embed="rId2">
+            <a:extLst>
+              <a:ext uri="{28A0092B-C50C-407E-A947-70E740481C1C}">
+                <a14:useLocalDpi xmlns:a14="http://schemas.microsoft.com/office/drawing/2010/main" val="0"/>
+              </a:ext>
+            </a:extLst>
+          </a:blip>
+          <a:srcRect b="5801"/>
+          <a:stretch/>
+        </p:blipFill>
+        <p:spPr>
+          <a:xfrm>
+            <a:off x="1653309" y="886691"/>
+            <a:ext cx="9079527" cy="5971309"/>
+          </a:xfrm>
+          <a:prstGeom prst="rect">
+            <a:avLst/>
+          </a:prstGeom>
+        </p:spPr>
+      </p:pic>
+    </p:spTree>
+    <p:extLst>
+      <p:ext uri="{BB962C8B-B14F-4D97-AF65-F5344CB8AC3E}">
+        <p14:creationId xmlns:p14="http://schemas.microsoft.com/office/powerpoint/2010/main" val="4105008646"/>
+      </p:ext>
+    </p:extLst>
+  </p:cSld>
+  <p:clrMapOvr>
+    <a:masterClrMapping/>
+  </p:clrMapOvr>
+</p:sld>
+</file>
+
+<file path=ppt/slides/slide14.xml><?xml version="1.0" encoding="utf-8"?>
+<p:sld xmlns:a="http://schemas.openxmlformats.org/drawingml/2006/main" xmlns:r="http://schemas.openxmlformats.org/officeDocument/2006/relationships" xmlns:p="http://schemas.openxmlformats.org/presentationml/2006/main">
+  <p:cSld>
+    <p:spTree>
+      <p:nvGrpSpPr>
+        <p:cNvPr id="1" name=""/>
+        <p:cNvGrpSpPr/>
+        <p:nvPr/>
+      </p:nvGrpSpPr>
+      <p:grpSpPr>
+        <a:xfrm>
+          <a:off x="0" y="0"/>
+          <a:ext cx="0" cy="0"/>
+          <a:chOff x="0" y="0"/>
+          <a:chExt cx="0" cy="0"/>
+        </a:xfrm>
+      </p:grpSpPr>
+      <p:sp>
+        <p:nvSpPr>
+          <p:cNvPr id="2" name="Title 1">
+            <a:extLst>
+              <a:ext uri="{FF2B5EF4-FFF2-40B4-BE49-F238E27FC236}">
+                <a16:creationId xmlns:a16="http://schemas.microsoft.com/office/drawing/2014/main" id="{BC64D27B-1E24-4200-A9E4-E9FC73A4E667}"/>
+              </a:ext>
+            </a:extLst>
+          </p:cNvPr>
+          <p:cNvSpPr>
+            <a:spLocks noGrp="1"/>
+          </p:cNvSpPr>
+          <p:nvPr>
+            <p:ph type="title"/>
+          </p:nvPr>
+        </p:nvSpPr>
+        <p:spPr>
+          <a:xfrm>
+            <a:off x="4313382" y="140377"/>
+            <a:ext cx="7571447" cy="656655"/>
+          </a:xfrm>
+        </p:spPr>
+        <p:txBody>
+          <a:bodyPr/>
+          <a:lstStyle/>
+          <a:p>
+            <a:r>
+              <a:rPr lang="en-US" dirty="0"/>
+              <a:t>Agent logs</a:t>
+            </a:r>
+          </a:p>
+        </p:txBody>
+      </p:sp>
+      <p:pic>
+        <p:nvPicPr>
+          <p:cNvPr id="4" name="Picture 3" descr="Text&#10;&#10;Description automatically generated">
+            <a:extLst>
+              <a:ext uri="{FF2B5EF4-FFF2-40B4-BE49-F238E27FC236}">
+                <a16:creationId xmlns:a16="http://schemas.microsoft.com/office/drawing/2014/main" id="{D6AB5727-BD04-4E38-ABC2-4C4180AD049F}"/>
+              </a:ext>
+            </a:extLst>
+          </p:cNvPr>
+          <p:cNvPicPr>
+            <a:picLocks noChangeAspect="1"/>
+          </p:cNvPicPr>
+          <p:nvPr/>
+        </p:nvPicPr>
+        <p:blipFill rotWithShape="1">
+          <a:blip r:embed="rId2">
+            <a:extLst>
+              <a:ext uri="{28A0092B-C50C-407E-A947-70E740481C1C}">
+                <a14:useLocalDpi xmlns:a14="http://schemas.microsoft.com/office/drawing/2010/main" val="0"/>
+              </a:ext>
+            </a:extLst>
+          </a:blip>
+          <a:srcRect b="5455"/>
+          <a:stretch/>
+        </p:blipFill>
+        <p:spPr>
+          <a:xfrm>
+            <a:off x="230909" y="886691"/>
+            <a:ext cx="11730182" cy="5301672"/>
+          </a:xfrm>
+          <a:prstGeom prst="rect">
+            <a:avLst/>
+          </a:prstGeom>
+        </p:spPr>
+      </p:pic>
+    </p:spTree>
+    <p:extLst>
+      <p:ext uri="{BB962C8B-B14F-4D97-AF65-F5344CB8AC3E}">
+        <p14:creationId xmlns:p14="http://schemas.microsoft.com/office/powerpoint/2010/main" val="959805825"/>
+      </p:ext>
+    </p:extLst>
+  </p:cSld>
+  <p:clrMapOvr>
+    <a:masterClrMapping/>
+  </p:clrMapOvr>
+</p:sld>
+</file>
+
+<file path=ppt/slides/slide15.xml><?xml version="1.0" encoding="utf-8"?>
+<p:sld xmlns:a="http://schemas.openxmlformats.org/drawingml/2006/main" xmlns:r="http://schemas.openxmlformats.org/officeDocument/2006/relationships" xmlns:p="http://schemas.openxmlformats.org/presentationml/2006/main">
+  <p:cSld>
+    <p:spTree>
+      <p:nvGrpSpPr>
+        <p:cNvPr id="1" name=""/>
+        <p:cNvGrpSpPr/>
+        <p:nvPr/>
+      </p:nvGrpSpPr>
+      <p:grpSpPr>
+        <a:xfrm>
+          <a:off x="0" y="0"/>
+          <a:ext cx="0" cy="0"/>
+          <a:chOff x="0" y="0"/>
+          <a:chExt cx="0" cy="0"/>
+        </a:xfrm>
+      </p:grpSpPr>
+      <p:sp>
+        <p:nvSpPr>
+          <p:cNvPr id="2" name="Title 1">
+            <a:extLst>
+              <a:ext uri="{FF2B5EF4-FFF2-40B4-BE49-F238E27FC236}">
                 <a16:creationId xmlns:a16="http://schemas.microsoft.com/office/drawing/2014/main" id="{DFD5FB5F-198E-45C6-A3A8-1273565BF79D}"/>
               </a:ext>
             </a:extLst>
@@ -8204,7 +8603,7 @@
 </p:sld>
 </file>
 
-<file path=ppt/slides/slide13.xml><?xml version="1.0" encoding="utf-8"?>
+<file path=ppt/slides/slide16.xml><?xml version="1.0" encoding="utf-8"?>
 <p:sld xmlns:a="http://schemas.openxmlformats.org/drawingml/2006/main" xmlns:r="http://schemas.openxmlformats.org/officeDocument/2006/relationships" xmlns:p="http://schemas.openxmlformats.org/presentationml/2006/main">
   <p:cSld>
     <p:spTree>
@@ -10952,12 +11351,6 @@
 </file>
 
 <file path=customXml/item2.xml><?xml version="1.0" encoding="utf-8"?>
-<p:properties xmlns:p="http://schemas.microsoft.com/office/2006/metadata/properties" xmlns:xsi="http://www.w3.org/2001/XMLSchema-instance" xmlns:pc="http://schemas.microsoft.com/office/infopath/2007/PartnerControls">
-  <documentManagement/>
-</p:properties>
-</file>
-
-<file path=customXml/item3.xml><?xml version="1.0" encoding="utf-8"?>
 <ct:contentTypeSchema xmlns:ct="http://schemas.microsoft.com/office/2006/metadata/contentType" xmlns:ma="http://schemas.microsoft.com/office/2006/metadata/properties/metaAttributes" ct:_="" ma:_="" ma:contentTypeName="Document" ma:contentTypeID="0x01010065DE2A5E00E86B4290CB192C3EF7BE15" ma:contentTypeVersion="14" ma:contentTypeDescription="Create a new document." ma:contentTypeScope="" ma:versionID="7c1fb0bd409b632b979ba4f1a2c7680a">
   <xsd:schema xmlns:xsd="http://www.w3.org/2001/XMLSchema" xmlns:xs="http://www.w3.org/2001/XMLSchema" xmlns:p="http://schemas.microsoft.com/office/2006/metadata/properties" xmlns:ns3="80988191-8a4e-4d80-ae64-3da7164900c4" xmlns:ns4="a6c835c0-2fde-44e6-ab42-84c6f93c56ee" targetNamespace="http://schemas.microsoft.com/office/2006/metadata/properties" ma:root="true" ma:fieldsID="38ae397688c12b81d4ef6b7ee83f8bda" ns3:_="" ns4:_="">
     <xsd:import namespace="80988191-8a4e-4d80-ae64-3da7164900c4"/>
@@ -11186,6 +11579,12 @@
 </ct:contentTypeSchema>
 </file>
 
+<file path=customXml/item3.xml><?xml version="1.0" encoding="utf-8"?>
+<p:properties xmlns:p="http://schemas.microsoft.com/office/2006/metadata/properties" xmlns:xsi="http://www.w3.org/2001/XMLSchema-instance" xmlns:pc="http://schemas.microsoft.com/office/infopath/2007/PartnerControls">
+  <documentManagement/>
+</p:properties>
+</file>
+
 <file path=customXml/itemProps1.xml><?xml version="1.0" encoding="utf-8"?>
 <ds:datastoreItem xmlns:ds="http://schemas.openxmlformats.org/officeDocument/2006/customXml" ds:itemID="{AB22554F-EF5C-4E4A-BA99-7288FC7D5DC6}">
   <ds:schemaRefs>
@@ -11195,23 +11594,6 @@
 </file>
 
 <file path=customXml/itemProps2.xml><?xml version="1.0" encoding="utf-8"?>
-<ds:datastoreItem xmlns:ds="http://schemas.openxmlformats.org/officeDocument/2006/customXml" ds:itemID="{35DDED8F-32D9-4FD1-92A4-9103C643837E}">
-  <ds:schemaRefs>
-    <ds:schemaRef ds:uri="http://www.w3.org/XML/1998/namespace"/>
-    <ds:schemaRef ds:uri="http://schemas.microsoft.com/office/2006/metadata/properties"/>
-    <ds:schemaRef ds:uri="http://schemas.openxmlformats.org/package/2006/metadata/core-properties"/>
-    <ds:schemaRef ds:uri="http://purl.org/dc/elements/1.1/"/>
-    <ds:schemaRef ds:uri="http://schemas.microsoft.com/office/2006/documentManagement/types"/>
-    <ds:schemaRef ds:uri="http://purl.org/dc/dcmitype/"/>
-    <ds:schemaRef ds:uri="http://schemas.microsoft.com/office/infopath/2007/PartnerControls"/>
-    <ds:schemaRef ds:uri="80988191-8a4e-4d80-ae64-3da7164900c4"/>
-    <ds:schemaRef ds:uri="http://purl.org/dc/terms/"/>
-    <ds:schemaRef ds:uri="a6c835c0-2fde-44e6-ab42-84c6f93c56ee"/>
-  </ds:schemaRefs>
-</ds:datastoreItem>
-</file>
-
-<file path=customXml/itemProps3.xml><?xml version="1.0" encoding="utf-8"?>
 <ds:datastoreItem xmlns:ds="http://schemas.openxmlformats.org/officeDocument/2006/customXml" ds:itemID="{B56CA16F-DE57-4B0B-91AF-A5EE411202FB}">
   <ds:schemaRefs>
     <ds:schemaRef ds:uri="80988191-8a4e-4d80-ae64-3da7164900c4"/>
@@ -11228,4 +11610,21 @@
     <ds:schemaRef ds:uri="http://www.w3.org/2001/XMLSchema"/>
   </ds:schemaRefs>
 </ds:datastoreItem>
+</file>
+
+<file path=customXml/itemProps3.xml><?xml version="1.0" encoding="utf-8"?>
+<ds:datastoreItem xmlns:ds="http://schemas.openxmlformats.org/officeDocument/2006/customXml" ds:itemID="{35DDED8F-32D9-4FD1-92A4-9103C643837E}">
+  <ds:schemaRefs>
+    <ds:schemaRef ds:uri="http://www.w3.org/XML/1998/namespace"/>
+    <ds:schemaRef ds:uri="http://schemas.microsoft.com/office/2006/metadata/properties"/>
+    <ds:schemaRef ds:uri="http://schemas.openxmlformats.org/package/2006/metadata/core-properties"/>
+    <ds:schemaRef ds:uri="http://purl.org/dc/elements/1.1/"/>
+    <ds:schemaRef ds:uri="http://schemas.microsoft.com/office/2006/documentManagement/types"/>
+    <ds:schemaRef ds:uri="http://purl.org/dc/dcmitype/"/>
+    <ds:schemaRef ds:uri="http://schemas.microsoft.com/office/infopath/2007/PartnerControls"/>
+    <ds:schemaRef ds:uri="80988191-8a4e-4d80-ae64-3da7164900c4"/>
+    <ds:schemaRef ds:uri="http://purl.org/dc/terms/"/>
+    <ds:schemaRef ds:uri="a6c835c0-2fde-44e6-ab42-84c6f93c56ee"/>
+  </ds:schemaRefs>
+</ds:datastoreItem>
 </file>
</xml_diff>